<commit_message>
Week One Homework Set
</commit_message>
<xml_diff>
--- a/PPT/Python01.pptx
+++ b/PPT/Python01.pptx
@@ -358,7 +358,7 @@
           <a:p>
             <a:fld id="{E367A65E-C0B5-4359-B3F1-9931383D76D0}" type="datetimeFigureOut">
               <a:rPr lang="zh-CN" altLang="en-US" smtClean="0"/>
-              <a:t>2018/10/23</a:t>
+              <a:t>2018/10/24</a:t>
             </a:fld>
             <a:endParaRPr lang="zh-CN" altLang="en-US"/>
           </a:p>
@@ -528,7 +528,7 @@
           <a:p>
             <a:fld id="{E367A65E-C0B5-4359-B3F1-9931383D76D0}" type="datetimeFigureOut">
               <a:rPr lang="zh-CN" altLang="en-US" smtClean="0"/>
-              <a:t>2018/10/23</a:t>
+              <a:t>2018/10/24</a:t>
             </a:fld>
             <a:endParaRPr lang="zh-CN" altLang="en-US"/>
           </a:p>
@@ -708,7 +708,7 @@
           <a:p>
             <a:fld id="{E367A65E-C0B5-4359-B3F1-9931383D76D0}" type="datetimeFigureOut">
               <a:rPr lang="zh-CN" altLang="en-US" smtClean="0"/>
-              <a:t>2018/10/23</a:t>
+              <a:t>2018/10/24</a:t>
             </a:fld>
             <a:endParaRPr lang="zh-CN" altLang="en-US"/>
           </a:p>
@@ -878,7 +878,7 @@
           <a:p>
             <a:fld id="{E367A65E-C0B5-4359-B3F1-9931383D76D0}" type="datetimeFigureOut">
               <a:rPr lang="zh-CN" altLang="en-US" smtClean="0"/>
-              <a:t>2018/10/23</a:t>
+              <a:t>2018/10/24</a:t>
             </a:fld>
             <a:endParaRPr lang="zh-CN" altLang="en-US"/>
           </a:p>
@@ -1124,7 +1124,7 @@
           <a:p>
             <a:fld id="{E367A65E-C0B5-4359-B3F1-9931383D76D0}" type="datetimeFigureOut">
               <a:rPr lang="zh-CN" altLang="en-US" smtClean="0"/>
-              <a:t>2018/10/23</a:t>
+              <a:t>2018/10/24</a:t>
             </a:fld>
             <a:endParaRPr lang="zh-CN" altLang="en-US"/>
           </a:p>
@@ -1356,7 +1356,7 @@
           <a:p>
             <a:fld id="{E367A65E-C0B5-4359-B3F1-9931383D76D0}" type="datetimeFigureOut">
               <a:rPr lang="zh-CN" altLang="en-US" smtClean="0"/>
-              <a:t>2018/10/23</a:t>
+              <a:t>2018/10/24</a:t>
             </a:fld>
             <a:endParaRPr lang="zh-CN" altLang="en-US"/>
           </a:p>
@@ -1723,7 +1723,7 @@
           <a:p>
             <a:fld id="{E367A65E-C0B5-4359-B3F1-9931383D76D0}" type="datetimeFigureOut">
               <a:rPr lang="zh-CN" altLang="en-US" smtClean="0"/>
-              <a:t>2018/10/23</a:t>
+              <a:t>2018/10/24</a:t>
             </a:fld>
             <a:endParaRPr lang="zh-CN" altLang="en-US"/>
           </a:p>
@@ -1841,7 +1841,7 @@
           <a:p>
             <a:fld id="{E367A65E-C0B5-4359-B3F1-9931383D76D0}" type="datetimeFigureOut">
               <a:rPr lang="zh-CN" altLang="en-US" smtClean="0"/>
-              <a:t>2018/10/23</a:t>
+              <a:t>2018/10/24</a:t>
             </a:fld>
             <a:endParaRPr lang="zh-CN" altLang="en-US"/>
           </a:p>
@@ -1936,7 +1936,7 @@
           <a:p>
             <a:fld id="{E367A65E-C0B5-4359-B3F1-9931383D76D0}" type="datetimeFigureOut">
               <a:rPr lang="zh-CN" altLang="en-US" smtClean="0"/>
-              <a:t>2018/10/23</a:t>
+              <a:t>2018/10/24</a:t>
             </a:fld>
             <a:endParaRPr lang="zh-CN" altLang="en-US"/>
           </a:p>
@@ -2213,7 +2213,7 @@
           <a:p>
             <a:fld id="{E367A65E-C0B5-4359-B3F1-9931383D76D0}" type="datetimeFigureOut">
               <a:rPr lang="zh-CN" altLang="en-US" smtClean="0"/>
-              <a:t>2018/10/23</a:t>
+              <a:t>2018/10/24</a:t>
             </a:fld>
             <a:endParaRPr lang="zh-CN" altLang="en-US"/>
           </a:p>
@@ -2466,7 +2466,7 @@
           <a:p>
             <a:fld id="{E367A65E-C0B5-4359-B3F1-9931383D76D0}" type="datetimeFigureOut">
               <a:rPr lang="zh-CN" altLang="en-US" smtClean="0"/>
-              <a:t>2018/10/23</a:t>
+              <a:t>2018/10/24</a:t>
             </a:fld>
             <a:endParaRPr lang="zh-CN" altLang="en-US"/>
           </a:p>
@@ -2679,7 +2679,7 @@
           <a:p>
             <a:fld id="{E367A65E-C0B5-4359-B3F1-9931383D76D0}" type="datetimeFigureOut">
               <a:rPr lang="zh-CN" altLang="en-US" smtClean="0"/>
-              <a:t>2018/10/23</a:t>
+              <a:t>2018/10/24</a:t>
             </a:fld>
             <a:endParaRPr lang="zh-CN" altLang="en-US"/>
           </a:p>
@@ -5922,11 +5922,7 @@
           <a:p>
             <a:r>
               <a:rPr lang="zh-CN" altLang="en-US" dirty="0" smtClean="0"/>
-              <a:t>实战：</a:t>
-            </a:r>
-            <a:r>
-              <a:rPr lang="zh-CN" altLang="en-US" dirty="0" smtClean="0"/>
-              <a:t>写出九九乘法表</a:t>
+              <a:t>实战：写出九九乘法表</a:t>
             </a:r>
             <a:endParaRPr lang="zh-CN" altLang="en-US" dirty="0"/>
           </a:p>
@@ -7475,11 +7471,15 @@
             </a:r>
             <a:r>
               <a:rPr lang="en-US" altLang="zh-CN" dirty="0" err="1" smtClean="0"/>
-              <a:t>Git</a:t>
+              <a:t>Github</a:t>
             </a:r>
             <a:r>
               <a:rPr lang="zh-CN" altLang="en-US" dirty="0" smtClean="0"/>
-              <a:t>与下载</a:t>
+              <a:t>与</a:t>
+            </a:r>
+            <a:r>
+              <a:rPr lang="zh-CN" altLang="en-US" dirty="0" smtClean="0"/>
+              <a:t>下载</a:t>
             </a:r>
             <a:r>
               <a:rPr lang="en-US" altLang="zh-CN" dirty="0" err="1" smtClean="0"/>
@@ -7558,7 +7558,44 @@
             </a:r>
             <a:r>
               <a:rPr lang="en-US" altLang="zh-CN" dirty="0" smtClean="0"/>
-              <a:t> push -u origin master</a:t>
+              <a:t> push -u origin </a:t>
+            </a:r>
+            <a:r>
+              <a:rPr lang="en-US" altLang="zh-CN" dirty="0" smtClean="0"/>
+              <a:t>master</a:t>
+            </a:r>
+          </a:p>
+          <a:p>
+            <a:pPr marL="457200" lvl="1" indent="0">
+              <a:buNone/>
+            </a:pPr>
+            <a:endParaRPr lang="en-US" altLang="zh-CN" dirty="0"/>
+          </a:p>
+          <a:p>
+            <a:pPr marL="0" indent="0">
+              <a:buNone/>
+            </a:pPr>
+            <a:r>
+              <a:rPr lang="en-US" altLang="zh-CN" dirty="0" smtClean="0"/>
+              <a:t>Mac</a:t>
+            </a:r>
+            <a:r>
+              <a:rPr lang="zh-CN" altLang="en-US" dirty="0" smtClean="0"/>
+              <a:t>安装</a:t>
+            </a:r>
+            <a:endParaRPr lang="en-US" altLang="zh-CN" dirty="0"/>
+          </a:p>
+          <a:p>
+            <a:pPr marL="457200" lvl="1" indent="0">
+              <a:buNone/>
+            </a:pPr>
+            <a:r>
+              <a:rPr lang="en-US" altLang="zh-CN" dirty="0" smtClean="0"/>
+              <a:t>Brew install </a:t>
+            </a:r>
+            <a:r>
+              <a:rPr lang="en-US" altLang="zh-CN" dirty="0" err="1" smtClean="0"/>
+              <a:t>Git</a:t>
             </a:r>
             <a:endParaRPr lang="zh-CN" altLang="en-US" dirty="0"/>
           </a:p>

</xml_diff>